<commit_message>
28April 2022 Java basics and control statements
</commit_message>
<xml_diff>
--- a/target/test-classes/TestNG.pptx
+++ b/target/test-classes/TestNG.pptx
@@ -270,7 +270,7 @@
           <a:p>
             <a:fld id="{474FEC44-FE25-432A-B7F6-7BDB637AC3B5}" type="datetimeFigureOut">
               <a:rPr lang="en-IN" smtClean="0"/>
-              <a:t>22-04-2022</a:t>
+              <a:t>04-09-2021</a:t>
             </a:fld>
             <a:endParaRPr lang="en-IN"/>
           </a:p>
@@ -470,7 +470,7 @@
           <a:p>
             <a:fld id="{474FEC44-FE25-432A-B7F6-7BDB637AC3B5}" type="datetimeFigureOut">
               <a:rPr lang="en-IN" smtClean="0"/>
-              <a:t>22-04-2022</a:t>
+              <a:t>04-09-2021</a:t>
             </a:fld>
             <a:endParaRPr lang="en-IN"/>
           </a:p>
@@ -680,7 +680,7 @@
           <a:p>
             <a:fld id="{474FEC44-FE25-432A-B7F6-7BDB637AC3B5}" type="datetimeFigureOut">
               <a:rPr lang="en-IN" smtClean="0"/>
-              <a:t>22-04-2022</a:t>
+              <a:t>04-09-2021</a:t>
             </a:fld>
             <a:endParaRPr lang="en-IN"/>
           </a:p>
@@ -880,7 +880,7 @@
           <a:p>
             <a:fld id="{474FEC44-FE25-432A-B7F6-7BDB637AC3B5}" type="datetimeFigureOut">
               <a:rPr lang="en-IN" smtClean="0"/>
-              <a:t>22-04-2022</a:t>
+              <a:t>04-09-2021</a:t>
             </a:fld>
             <a:endParaRPr lang="en-IN"/>
           </a:p>
@@ -1156,7 +1156,7 @@
           <a:p>
             <a:fld id="{474FEC44-FE25-432A-B7F6-7BDB637AC3B5}" type="datetimeFigureOut">
               <a:rPr lang="en-IN" smtClean="0"/>
-              <a:t>22-04-2022</a:t>
+              <a:t>04-09-2021</a:t>
             </a:fld>
             <a:endParaRPr lang="en-IN"/>
           </a:p>
@@ -1424,7 +1424,7 @@
           <a:p>
             <a:fld id="{474FEC44-FE25-432A-B7F6-7BDB637AC3B5}" type="datetimeFigureOut">
               <a:rPr lang="en-IN" smtClean="0"/>
-              <a:t>22-04-2022</a:t>
+              <a:t>04-09-2021</a:t>
             </a:fld>
             <a:endParaRPr lang="en-IN"/>
           </a:p>
@@ -1839,7 +1839,7 @@
           <a:p>
             <a:fld id="{474FEC44-FE25-432A-B7F6-7BDB637AC3B5}" type="datetimeFigureOut">
               <a:rPr lang="en-IN" smtClean="0"/>
-              <a:t>22-04-2022</a:t>
+              <a:t>04-09-2021</a:t>
             </a:fld>
             <a:endParaRPr lang="en-IN"/>
           </a:p>
@@ -1981,7 +1981,7 @@
           <a:p>
             <a:fld id="{474FEC44-FE25-432A-B7F6-7BDB637AC3B5}" type="datetimeFigureOut">
               <a:rPr lang="en-IN" smtClean="0"/>
-              <a:t>22-04-2022</a:t>
+              <a:t>04-09-2021</a:t>
             </a:fld>
             <a:endParaRPr lang="en-IN"/>
           </a:p>
@@ -2094,7 +2094,7 @@
           <a:p>
             <a:fld id="{474FEC44-FE25-432A-B7F6-7BDB637AC3B5}" type="datetimeFigureOut">
               <a:rPr lang="en-IN" smtClean="0"/>
-              <a:t>22-04-2022</a:t>
+              <a:t>04-09-2021</a:t>
             </a:fld>
             <a:endParaRPr lang="en-IN"/>
           </a:p>
@@ -2407,7 +2407,7 @@
           <a:p>
             <a:fld id="{474FEC44-FE25-432A-B7F6-7BDB637AC3B5}" type="datetimeFigureOut">
               <a:rPr lang="en-IN" smtClean="0"/>
-              <a:t>22-04-2022</a:t>
+              <a:t>04-09-2021</a:t>
             </a:fld>
             <a:endParaRPr lang="en-IN"/>
           </a:p>
@@ -2696,7 +2696,7 @@
           <a:p>
             <a:fld id="{474FEC44-FE25-432A-B7F6-7BDB637AC3B5}" type="datetimeFigureOut">
               <a:rPr lang="en-IN" smtClean="0"/>
-              <a:t>22-04-2022</a:t>
+              <a:t>04-09-2021</a:t>
             </a:fld>
             <a:endParaRPr lang="en-IN"/>
           </a:p>
@@ -2939,7 +2939,7 @@
           <a:p>
             <a:fld id="{474FEC44-FE25-432A-B7F6-7BDB637AC3B5}" type="datetimeFigureOut">
               <a:rPr lang="en-IN" smtClean="0"/>
-              <a:t>22-04-2022</a:t>
+              <a:t>04-09-2021</a:t>
             </a:fld>
             <a:endParaRPr lang="en-IN"/>
           </a:p>
@@ -3800,21 +3800,21 @@
             <p:ph idx="1"/>
             <p:extLst>
               <p:ext uri="{D42A27DB-BD31-4B8C-83A1-F6EECF244321}">
-                <p14:modId xmlns:p14="http://schemas.microsoft.com/office/powerpoint/2010/main" val="1972721997"/>
+                <p14:modId xmlns:p14="http://schemas.microsoft.com/office/powerpoint/2010/main" val="679049125"/>
               </p:ext>
             </p:extLst>
           </p:nvPr>
         </p:nvGraphicFramePr>
         <p:xfrm>
-          <a:off x="359028" y="942450"/>
-          <a:ext cx="11674027" cy="5542605"/>
+          <a:off x="387077" y="942450"/>
+          <a:ext cx="11645978" cy="5573607"/>
         </p:xfrm>
         <a:graphic>
           <a:graphicData uri="http://schemas.openxmlformats.org/drawingml/2006/table">
             <a:tbl>
               <a:tblPr/>
               <a:tblGrid>
-                <a:gridCol w="1506330">
+                <a:gridCol w="1478281">
                   <a:extLst>
                     <a:ext uri="{9D8B030D-6E8A-4147-A177-3AD203B41FA5}">
                       <a16:colId xmlns:a16="http://schemas.microsoft.com/office/drawing/2014/main" val="1548275871"/>

</xml_diff>